<commit_message>
BrightonR - AutoGluon Slide Updates
</commit_message>
<xml_diff>
--- a/docs/2022-04-28 BrightonR, Dayo Oguntoyinbo AutoGluon Presentation.pptx
+++ b/docs/2022-04-28 BrightonR, Dayo Oguntoyinbo AutoGluon Presentation.pptx
@@ -4885,7 +4885,7 @@
           <a:graphicData uri="http://schemas.openxmlformats.org/presentationml/2006/ole">
             <mc:AlternateContent xmlns:mc="http://schemas.openxmlformats.org/markup-compatibility/2006">
               <mc:Choice xmlns:v="urn:schemas-microsoft-com:vml" Requires="v">
-                <p:oleObj spid="_x0000_s5131" name="Acrobat Document" r:id="rId3" imgW="10477426" imgH="8095987" progId="Acrobat.Document.DC">
+                <p:oleObj spid="_x0000_s5134" name="Acrobat Document" r:id="rId3" imgW="10477426" imgH="8095987" progId="Acrobat.Document.DC">
                   <p:embed/>
                 </p:oleObj>
               </mc:Choice>
@@ -6428,7 +6428,7 @@
               <a:rPr lang="en-GB" sz="2000" dirty="0">
                 <a:latin typeface="Tw Cen MT" panose="020B0602020104020603" pitchFamily="34" charset="0"/>
               </a:rPr>
-              <a:t>Let’s have a quick dive.</a:t>
+              <a:t>Let’s have a quick deep dive.</a:t>
             </a:r>
           </a:p>
           <a:p>
@@ -6458,7 +6458,7 @@
               <a:rPr lang="en-GB" sz="2000" dirty="0">
                 <a:latin typeface="Tw Cen MT" panose="020B0602020104020603" pitchFamily="34" charset="0"/>
               </a:rPr>
-              <a:t>You can certainly use your preferred. But a caveat for Windows users, there is currently capability for Tabular Prediction.</a:t>
+              <a:t>You can certainly use your preferred cloud or machine. But a caveat for Windows users, there is currently only Tabular Prediction capability.</a:t>
             </a:r>
           </a:p>
           <a:p>
@@ -9733,7 +9733,7 @@
         </p:nvSpPr>
         <p:spPr>
           <a:xfrm>
-            <a:off x="6895186" y="2124075"/>
+            <a:off x="6886948" y="2124075"/>
             <a:ext cx="1809750" cy="1847283"/>
           </a:xfrm>
           <a:prstGeom prst="rect">
@@ -9838,7 +9838,7 @@
         </p:nvSpPr>
         <p:spPr>
           <a:xfrm flipH="1">
-            <a:off x="6957098" y="2192536"/>
+            <a:off x="6948860" y="2192536"/>
             <a:ext cx="1704975" cy="369332"/>
           </a:xfrm>
           <a:prstGeom prst="rect">
@@ -10533,7 +10533,7 @@
         </p:nvGrpSpPr>
         <p:grpSpPr>
           <a:xfrm>
-            <a:off x="6925566" y="2580521"/>
+            <a:off x="6917328" y="2580521"/>
             <a:ext cx="1745658" cy="1334988"/>
             <a:chOff x="995761" y="2580521"/>
             <a:chExt cx="1745658" cy="1334988"/>
@@ -12995,10 +12995,10 @@
       </p:grpSp>
       <p:pic>
         <p:nvPicPr>
-          <p:cNvPr id="4098" name="Picture 2" descr="Audience Insight Icon - Audience Insights Icon Png, Transparent Png -  kindpng">
-            <a:extLst>
-              <a:ext uri="{FF2B5EF4-FFF2-40B4-BE49-F238E27FC236}">
-                <a16:creationId xmlns:a16="http://schemas.microsoft.com/office/drawing/2014/main" id="{C735FDFD-9E4F-442B-B814-B037BCEEA698}"/>
+          <p:cNvPr id="4100" name="Picture 4" descr="Captures, recopilation, data, collection, sources icon - Download on  Iconfinder">
+            <a:extLst>
+              <a:ext uri="{FF2B5EF4-FFF2-40B4-BE49-F238E27FC236}">
+                <a16:creationId xmlns:a16="http://schemas.microsoft.com/office/drawing/2014/main" id="{F868C622-8B3E-4EFB-9900-3C3C7DEFA4CC}"/>
               </a:ext>
             </a:extLst>
           </p:cNvPr>
@@ -13022,50 +13022,7 @@
         </p:blipFill>
         <p:spPr bwMode="auto">
           <a:xfrm>
-            <a:off x="1671005" y="2857947"/>
-            <a:ext cx="991982" cy="991982"/>
-          </a:xfrm>
-          <a:prstGeom prst="rect">
-            <a:avLst/>
-          </a:prstGeom>
-          <a:solidFill>
-            <a:srgbClr val="92D050"/>
-          </a:solidFill>
-          <a:ln>
-            <a:noFill/>
-          </a:ln>
-        </p:spPr>
-      </p:pic>
-      <p:pic>
-        <p:nvPicPr>
-          <p:cNvPr id="4100" name="Picture 4" descr="Captures, recopilation, data, collection, sources icon - Download on  Iconfinder">
-            <a:extLst>
-              <a:ext uri="{FF2B5EF4-FFF2-40B4-BE49-F238E27FC236}">
-                <a16:creationId xmlns:a16="http://schemas.microsoft.com/office/drawing/2014/main" id="{F868C622-8B3E-4EFB-9900-3C3C7DEFA4CC}"/>
-              </a:ext>
-            </a:extLst>
-          </p:cNvPr>
-          <p:cNvPicPr>
-            <a:picLocks noChangeAspect="1" noChangeArrowheads="1"/>
-          </p:cNvPicPr>
-          <p:nvPr/>
-        </p:nvPicPr>
-        <p:blipFill>
-          <a:blip r:embed="rId3">
-            <a:extLst>
-              <a:ext uri="{28A0092B-C50C-407E-A947-70E740481C1C}">
-                <a14:useLocalDpi xmlns:a14="http://schemas.microsoft.com/office/drawing/2010/main" val="0"/>
-              </a:ext>
-            </a:extLst>
-          </a:blip>
-          <a:srcRect/>
-          <a:stretch>
-            <a:fillRect/>
-          </a:stretch>
-        </p:blipFill>
-        <p:spPr bwMode="auto">
-          <a:xfrm>
-            <a:off x="3613507" y="2756553"/>
+            <a:off x="3619997" y="2778407"/>
             <a:ext cx="1093376" cy="1093376"/>
           </a:xfrm>
           <a:prstGeom prst="rect">
@@ -13098,7 +13055,7 @@
           <p:nvPr/>
         </p:nvPicPr>
         <p:blipFill>
-          <a:blip r:embed="rId4">
+          <a:blip r:embed="rId3">
             <a:extLst>
               <a:ext uri="{28A0092B-C50C-407E-A947-70E740481C1C}">
                 <a14:useLocalDpi xmlns:a14="http://schemas.microsoft.com/office/drawing/2010/main" val="0"/>
@@ -13441,7 +13398,7 @@
           <p:nvPr/>
         </p:nvPicPr>
         <p:blipFill>
-          <a:blip r:embed="rId5">
+          <a:blip r:embed="rId4">
             <a:biLevel thresh="50000"/>
             <a:extLst>
               <a:ext uri="{28A0092B-C50C-407E-A947-70E740481C1C}">
@@ -13489,7 +13446,7 @@
           <p:nvPr/>
         </p:nvPicPr>
         <p:blipFill>
-          <a:blip r:embed="rId6">
+          <a:blip r:embed="rId5">
             <a:extLst>
               <a:ext uri="{28A0092B-C50C-407E-A947-70E740481C1C}">
                 <a14:useLocalDpi xmlns:a14="http://schemas.microsoft.com/office/drawing/2010/main" val="0"/>
@@ -13536,7 +13493,7 @@
           <p:nvPr/>
         </p:nvPicPr>
         <p:blipFill>
-          <a:blip r:embed="rId7">
+          <a:blip r:embed="rId6">
             <a:extLst>
               <a:ext uri="{28A0092B-C50C-407E-A947-70E740481C1C}">
                 <a14:useLocalDpi xmlns:a14="http://schemas.microsoft.com/office/drawing/2010/main" val="0"/>
@@ -13583,7 +13540,7 @@
           <p:nvPr/>
         </p:nvPicPr>
         <p:blipFill>
-          <a:blip r:embed="rId8">
+          <a:blip r:embed="rId7">
             <a:extLst>
               <a:ext uri="{28A0092B-C50C-407E-A947-70E740481C1C}">
                 <a14:useLocalDpi xmlns:a14="http://schemas.microsoft.com/office/drawing/2010/main" val="0"/>
@@ -13613,6 +13570,36 @@
               </a14:hiddenFill>
             </a:ext>
           </a:extLst>
+        </p:spPr>
+      </p:pic>
+      <p:pic>
+        <p:nvPicPr>
+          <p:cNvPr id="5" name="Picture 4">
+            <a:extLst>
+              <a:ext uri="{FF2B5EF4-FFF2-40B4-BE49-F238E27FC236}">
+                <a16:creationId xmlns:a16="http://schemas.microsoft.com/office/drawing/2014/main" id="{D5DCACE1-5CEC-4A78-97A1-DC4E59FA1BF9}"/>
+              </a:ext>
+            </a:extLst>
+          </p:cNvPr>
+          <p:cNvPicPr>
+            <a:picLocks noChangeAspect="1"/>
+          </p:cNvPicPr>
+          <p:nvPr/>
+        </p:nvPicPr>
+        <p:blipFill>
+          <a:blip r:embed="rId8"/>
+          <a:stretch>
+            <a:fillRect/>
+          </a:stretch>
+        </p:blipFill>
+        <p:spPr>
+          <a:xfrm>
+            <a:off x="1696047" y="2810599"/>
+            <a:ext cx="973031" cy="1061488"/>
+          </a:xfrm>
+          <a:prstGeom prst="rect">
+            <a:avLst/>
+          </a:prstGeom>
         </p:spPr>
       </p:pic>
     </p:spTree>
@@ -14404,7 +14391,31 @@
               <a:rPr lang="en-GB" sz="2000" dirty="0">
                 <a:latin typeface="Tw Cen MT" panose="020B0602020104020603" pitchFamily="34" charset="0"/>
               </a:rPr>
-              <a:t> allows quick automation of the fundamental building component of an entire Machine Learning pipeline by have an almost none or limited human intervention.</a:t>
+              <a:t> allows quick automation of the fundamental building component of an entire Machine Learning pipeline by having an almost </a:t>
+            </a:r>
+            <a:r>
+              <a:rPr lang="en-GB" sz="2000" b="1" dirty="0">
+                <a:latin typeface="Tw Cen MT" panose="020B0602020104020603" pitchFamily="34" charset="0"/>
+              </a:rPr>
+              <a:t>none</a:t>
+            </a:r>
+            <a:r>
+              <a:rPr lang="en-GB" sz="2000" dirty="0">
+                <a:latin typeface="Tw Cen MT" panose="020B0602020104020603" pitchFamily="34" charset="0"/>
+              </a:rPr>
+              <a:t> or </a:t>
+            </a:r>
+            <a:r>
+              <a:rPr lang="en-GB" sz="2000" b="1" dirty="0">
+                <a:latin typeface="Tw Cen MT" panose="020B0602020104020603" pitchFamily="34" charset="0"/>
+              </a:rPr>
+              <a:t>limited</a:t>
+            </a:r>
+            <a:r>
+              <a:rPr lang="en-GB" sz="2000" dirty="0">
+                <a:latin typeface="Tw Cen MT" panose="020B0602020104020603" pitchFamily="34" charset="0"/>
+              </a:rPr>
+              <a:t> human intervention.</a:t>
             </a:r>
           </a:p>
           <a:p>
@@ -14419,7 +14430,7 @@
               <a:rPr lang="en-GB" sz="2000" dirty="0">
                 <a:latin typeface="Tw Cen MT" panose="020B0602020104020603" pitchFamily="34" charset="0"/>
               </a:rPr>
-              <a:t>Consider your typical Machine Learning process, collect the data, prepare the data, maybe features engineering, select the algorithm, train the model, evaluate the model, tune or optimise the model parameter, make prediction and/or perhaps interpret the model.</a:t>
+              <a:t>Consider your typical Machine Learning process, collect the data, prepare the data, maybe features engineering, select the algorithm, train the model, evaluate the model, tune or optimise the model parameters, make prediction and/or perhaps interpret the model and so on.</a:t>
             </a:r>
           </a:p>
           <a:p>
@@ -15374,7 +15385,7 @@
               <a:rPr lang="en-GB" sz="2000" dirty="0">
                 <a:latin typeface="Tw Cen MT" panose="020B0602020104020603" pitchFamily="34" charset="0"/>
               </a:rPr>
-              <a:t> That release marks Amazon’s entrance in the ultra-competitive Automated machine learning (</a:t>
+              <a:t> That release marks Amazon’s entrance into the ultra-competitive Automated Machine Learning (</a:t>
             </a:r>
             <a:r>
               <a:rPr lang="en-GB" sz="2000" dirty="0" err="1">
@@ -15386,7 +15397,7 @@
               <a:rPr lang="en-GB" sz="2000" dirty="0">
                 <a:latin typeface="Tw Cen MT" panose="020B0602020104020603" pitchFamily="34" charset="0"/>
               </a:rPr>
-              <a:t>) space. And </a:t>
+              <a:t>) space. And then </a:t>
             </a:r>
             <a:r>
               <a:rPr lang="en-GB" sz="2000" dirty="0" err="1">
@@ -16267,7 +16278,7 @@
         <p:spPr>
           <a:xfrm>
             <a:off x="452394" y="1119906"/>
-            <a:ext cx="11089212" cy="5582747"/>
+            <a:ext cx="11089212" cy="4659417"/>
           </a:xfrm>
           <a:prstGeom prst="rect">
             <a:avLst/>
@@ -16324,7 +16335,7 @@
               <a:rPr lang="en-GB" sz="2000" dirty="0">
                 <a:latin typeface="Tw Cen MT" panose="020B0602020104020603" pitchFamily="34" charset="0"/>
               </a:rPr>
-              <a:t>According the official web page, </a:t>
+              <a:t>According to the official web page, </a:t>
             </a:r>
             <a:r>
               <a:rPr lang="en-GB" sz="2000" i="1" dirty="0" err="1">
@@ -16459,7 +16470,7 @@
               <a:rPr lang="en-GB" sz="2000" dirty="0">
                 <a:latin typeface="Tw Cen MT" panose="020B0602020104020603" pitchFamily="34" charset="0"/>
               </a:rPr>
-              <a:t> data</a:t>
+              <a:t> data.</a:t>
             </a:r>
           </a:p>
           <a:p>
@@ -16489,7 +16500,7 @@
               <a:rPr lang="en-GB" sz="2000" dirty="0">
                 <a:latin typeface="Tw Cen MT" panose="020B0602020104020603" pitchFamily="34" charset="0"/>
               </a:rPr>
-              <a:t>Making a quick deep learning prototype deep learning and creating classical ML solutions;</a:t>
+              <a:t>Making a quick deep learning prototype and creating classical ML solutions;</a:t>
             </a:r>
           </a:p>
           <a:p>
@@ -16504,7 +16515,7 @@
               <a:rPr lang="en-GB" sz="2000" dirty="0">
                 <a:latin typeface="Tw Cen MT" panose="020B0602020104020603" pitchFamily="34" charset="0"/>
               </a:rPr>
-              <a:t>Desired to automatically utilize state-of-the-art techniques without expert knowledge;</a:t>
+              <a:t>Automatically utilizing state-of-the-art techniques without expert knowledge;</a:t>
             </a:r>
           </a:p>
           <a:p>
@@ -16519,7 +16530,7 @@
               <a:rPr lang="en-GB" sz="2000" dirty="0">
                 <a:latin typeface="Tw Cen MT" panose="020B0602020104020603" pitchFamily="34" charset="0"/>
               </a:rPr>
-              <a:t>Thinking of leveraging automatic hyperparameter tuning, model selection, ensembling and data processing;</a:t>
+              <a:t>Leveraging automatic hyperparameter tuning, model selection, ensembling and data processing;</a:t>
             </a:r>
           </a:p>
           <a:p>
@@ -16567,7 +16578,7 @@
               <a:rPr lang="en-GB" sz="2000" dirty="0">
                 <a:latin typeface="Tw Cen MT" panose="020B0602020104020603" pitchFamily="34" charset="0"/>
               </a:rPr>
-              <a:t> can be used for Tabular, Image, Text Predictions and Object Detection, for Tabular, Image and Text Data alike.</a:t>
+              <a:t> can be used for Tabular, Image, Text Predictions and Object Detection.</a:t>
             </a:r>
           </a:p>
         </p:txBody>
@@ -17416,8 +17427,17 @@
               <a:rPr lang="en-GB" sz="2000" dirty="0">
                 <a:latin typeface="Tw Cen MT" panose="020B0602020104020603" pitchFamily="34" charset="0"/>
               </a:rPr>
-              <a:t>Nick Erickson </a:t>
-            </a:r>
+              <a:t>Alex </a:t>
+            </a:r>
+            <a:r>
+              <a:rPr lang="en-GB" sz="2000" dirty="0" err="1">
+                <a:latin typeface="Tw Cen MT" panose="020B0602020104020603" pitchFamily="34" charset="0"/>
+              </a:rPr>
+              <a:t>Shrikov</a:t>
+            </a:r>
+            <a:endParaRPr lang="en-GB" sz="2000" dirty="0">
+              <a:latin typeface="Tw Cen MT" panose="020B0602020104020603" pitchFamily="34" charset="0"/>
+            </a:endParaRPr>
           </a:p>
           <a:p>
             <a:pPr marL="342900" indent="-342900">
@@ -17428,17 +17448,8 @@
               <a:rPr lang="en-GB" sz="2000" dirty="0">
                 <a:latin typeface="Tw Cen MT" panose="020B0602020104020603" pitchFamily="34" charset="0"/>
               </a:rPr>
-              <a:t>Alex </a:t>
-            </a:r>
-            <a:r>
-              <a:rPr lang="en-GB" sz="2000" dirty="0" err="1">
-                <a:latin typeface="Tw Cen MT" panose="020B0602020104020603" pitchFamily="34" charset="0"/>
-              </a:rPr>
-              <a:t>Shrikov</a:t>
-            </a:r>
-            <a:endParaRPr lang="en-GB" sz="2000" dirty="0">
-              <a:latin typeface="Tw Cen MT" panose="020B0602020104020603" pitchFamily="34" charset="0"/>
-            </a:endParaRPr>
+              <a:t>Nick Erickson </a:t>
+            </a:r>
           </a:p>
         </p:txBody>
       </p:sp>
@@ -18759,7 +18770,7 @@
           <a:graphicData uri="http://schemas.openxmlformats.org/presentationml/2006/ole">
             <mc:AlternateContent xmlns:mc="http://schemas.openxmlformats.org/markup-compatibility/2006">
               <mc:Choice xmlns:v="urn:schemas-microsoft-com:vml" Requires="v">
-                <p:oleObj spid="_x0000_s2064" name="Acrobat Document" r:id="rId4" imgW="5829078" imgH="7543800" progId="Acrobat.Document.DC">
+                <p:oleObj spid="_x0000_s2067" name="Acrobat Document" r:id="rId4" imgW="5829078" imgH="7543800" progId="Acrobat.Document.DC">
                   <p:embed/>
                 </p:oleObj>
               </mc:Choice>

</xml_diff>